<commit_message>
Updated Acceptance Slides/Wiki Doc/ Archi Diagram
</commit_message>
<xml_diff>
--- a/Documentation/Wiki Documents/4. PROJECT MANAGEMENT/Timeline/Timeline iterations edit.pptx
+++ b/Documentation/Wiki Documents/4. PROJECT MANAGEMENT/Timeline/Timeline iterations edit.pptx
@@ -255,7 +255,7 @@
           <a:p>
             <a:fld id="{E5913C49-45AE-4926-BFC9-EBF79FA12E5C}" type="datetimeFigureOut">
               <a:rPr lang="en-US" smtClean="0"/>
-              <a:t>10/31/2016</a:t>
+              <a:t>11/2/2016</a:t>
             </a:fld>
             <a:endParaRPr lang="en-US"/>
           </a:p>
@@ -425,7 +425,7 @@
           <a:p>
             <a:fld id="{E5913C49-45AE-4926-BFC9-EBF79FA12E5C}" type="datetimeFigureOut">
               <a:rPr lang="en-US" smtClean="0"/>
-              <a:t>10/31/2016</a:t>
+              <a:t>11/2/2016</a:t>
             </a:fld>
             <a:endParaRPr lang="en-US"/>
           </a:p>
@@ -605,7 +605,7 @@
           <a:p>
             <a:fld id="{E5913C49-45AE-4926-BFC9-EBF79FA12E5C}" type="datetimeFigureOut">
               <a:rPr lang="en-US" smtClean="0"/>
-              <a:t>10/31/2016</a:t>
+              <a:t>11/2/2016</a:t>
             </a:fld>
             <a:endParaRPr lang="en-US"/>
           </a:p>
@@ -775,7 +775,7 @@
           <a:p>
             <a:fld id="{E5913C49-45AE-4926-BFC9-EBF79FA12E5C}" type="datetimeFigureOut">
               <a:rPr lang="en-US" smtClean="0"/>
-              <a:t>10/31/2016</a:t>
+              <a:t>11/2/2016</a:t>
             </a:fld>
             <a:endParaRPr lang="en-US"/>
           </a:p>
@@ -1019,7 +1019,7 @@
           <a:p>
             <a:fld id="{E5913C49-45AE-4926-BFC9-EBF79FA12E5C}" type="datetimeFigureOut">
               <a:rPr lang="en-US" smtClean="0"/>
-              <a:t>10/31/2016</a:t>
+              <a:t>11/2/2016</a:t>
             </a:fld>
             <a:endParaRPr lang="en-US"/>
           </a:p>
@@ -1251,7 +1251,7 @@
           <a:p>
             <a:fld id="{E5913C49-45AE-4926-BFC9-EBF79FA12E5C}" type="datetimeFigureOut">
               <a:rPr lang="en-US" smtClean="0"/>
-              <a:t>10/31/2016</a:t>
+              <a:t>11/2/2016</a:t>
             </a:fld>
             <a:endParaRPr lang="en-US"/>
           </a:p>
@@ -1618,7 +1618,7 @@
           <a:p>
             <a:fld id="{E5913C49-45AE-4926-BFC9-EBF79FA12E5C}" type="datetimeFigureOut">
               <a:rPr lang="en-US" smtClean="0"/>
-              <a:t>10/31/2016</a:t>
+              <a:t>11/2/2016</a:t>
             </a:fld>
             <a:endParaRPr lang="en-US"/>
           </a:p>
@@ -1736,7 +1736,7 @@
           <a:p>
             <a:fld id="{E5913C49-45AE-4926-BFC9-EBF79FA12E5C}" type="datetimeFigureOut">
               <a:rPr lang="en-US" smtClean="0"/>
-              <a:t>10/31/2016</a:t>
+              <a:t>11/2/2016</a:t>
             </a:fld>
             <a:endParaRPr lang="en-US"/>
           </a:p>
@@ -1831,7 +1831,7 @@
           <a:p>
             <a:fld id="{E5913C49-45AE-4926-BFC9-EBF79FA12E5C}" type="datetimeFigureOut">
               <a:rPr lang="en-US" smtClean="0"/>
-              <a:t>10/31/2016</a:t>
+              <a:t>11/2/2016</a:t>
             </a:fld>
             <a:endParaRPr lang="en-US"/>
           </a:p>
@@ -2108,7 +2108,7 @@
           <a:p>
             <a:fld id="{E5913C49-45AE-4926-BFC9-EBF79FA12E5C}" type="datetimeFigureOut">
               <a:rPr lang="en-US" smtClean="0"/>
-              <a:t>10/31/2016</a:t>
+              <a:t>11/2/2016</a:t>
             </a:fld>
             <a:endParaRPr lang="en-US"/>
           </a:p>
@@ -2365,7 +2365,7 @@
           <a:p>
             <a:fld id="{E5913C49-45AE-4926-BFC9-EBF79FA12E5C}" type="datetimeFigureOut">
               <a:rPr lang="en-US" smtClean="0"/>
-              <a:t>10/31/2016</a:t>
+              <a:t>11/2/2016</a:t>
             </a:fld>
             <a:endParaRPr lang="en-US"/>
           </a:p>
@@ -2578,7 +2578,7 @@
           <a:p>
             <a:fld id="{E5913C49-45AE-4926-BFC9-EBF79FA12E5C}" type="datetimeFigureOut">
               <a:rPr lang="en-US" smtClean="0"/>
-              <a:t>10/31/2016</a:t>
+              <a:t>11/2/2016</a:t>
             </a:fld>
             <a:endParaRPr lang="en-US"/>
           </a:p>
@@ -3581,7 +3581,7 @@
             <a:p>
               <a:r>
                 <a:rPr lang="en-US" sz="1600" dirty="0"/>
-                <a:t>2 Nov</a:t>
+                <a:t>1 Nov</a:t>
               </a:r>
               <a:endParaRPr lang="en-US" dirty="0"/>
             </a:p>
@@ -9921,7 +9921,7 @@
           <p:nvPr>
             <p:extLst>
               <p:ext uri="{D42A27DB-BD31-4B8C-83A1-F6EECF244321}">
-                <p14:modId xmlns:p14="http://schemas.microsoft.com/office/powerpoint/2010/main" val="231118595"/>
+                <p14:modId xmlns:p14="http://schemas.microsoft.com/office/powerpoint/2010/main" val="2478837045"/>
               </p:ext>
             </p:extLst>
           </p:nvPr>
@@ -9957,7 +9957,7 @@
                             <a:schemeClr val="bg1"/>
                           </a:solidFill>
                         </a:rPr>
-                        <a:t>Sprint</a:t>
+                        <a:t>Iteration</a:t>
                       </a:r>
                       <a:r>
                         <a:rPr lang="en-US" sz="1200" baseline="0" dirty="0">
@@ -15233,7 +15233,7 @@
           <a:p>
             <a:r>
               <a:rPr lang="en-US" dirty="0"/>
-              <a:t>Updated 7 pm 31 October</a:t>
+              <a:t>Updated 2 pm 1 November</a:t>
             </a:r>
           </a:p>
         </p:txBody>

</xml_diff>